<commit_message>
Added Critical Infrastructure Use Case modified:   docs/Threat Meta Model - Benefits and Use Cases-20140203.pptx
</commit_message>
<xml_diff>
--- a/docs/Threat Meta Model - Benefits and Use Cases-20140203.pptx
+++ b/docs/Threat Meta Model - Benefits and Use Cases-20140203.pptx
@@ -15,6 +15,9 @@
     <p:sldId id="260" r:id="rId9"/>
     <p:sldId id="265" r:id="rId10"/>
     <p:sldId id="264" r:id="rId11"/>
+    <p:sldId id="266" r:id="rId12"/>
+    <p:sldId id="267" r:id="rId13"/>
+    <p:sldId id="268" r:id="rId14"/>
   </p:sldIdLst>
   <p:sldSz cx="9144000" cy="6858000" type="screen4x3"/>
   <p:notesSz cx="6858000" cy="9144000"/>
@@ -15514,6 +15517,326 @@
 </p:sld>
 </file>
 
+<file path=ppt/slides/slide11.xml><?xml version="1.0" encoding="utf-8"?>
+<p:sld xmlns:a="http://schemas.openxmlformats.org/drawingml/2006/main" xmlns:r="http://schemas.openxmlformats.org/officeDocument/2006/relationships" xmlns:p="http://schemas.openxmlformats.org/presentationml/2006/main">
+  <p:cSld>
+    <p:spTree>
+      <p:nvGrpSpPr>
+        <p:cNvPr id="1" name=""/>
+        <p:cNvGrpSpPr/>
+        <p:nvPr/>
+      </p:nvGrpSpPr>
+      <p:grpSpPr>
+        <a:xfrm>
+          <a:off x="0" y="0"/>
+          <a:ext cx="0" cy="0"/>
+          <a:chOff x="0" y="0"/>
+          <a:chExt cx="0" cy="0"/>
+        </a:xfrm>
+      </p:grpSpPr>
+      <p:sp>
+        <p:nvSpPr>
+          <p:cNvPr id="2" name="Title 1"/>
+          <p:cNvSpPr>
+            <a:spLocks noGrp="1"/>
+          </p:cNvSpPr>
+          <p:nvPr>
+            <p:ph type="title"/>
+          </p:nvPr>
+        </p:nvSpPr>
+        <p:spPr/>
+        <p:txBody>
+          <a:bodyPr/>
+          <a:lstStyle/>
+          <a:p>
+            <a:r>
+              <a:rPr lang="en-US" dirty="0" smtClean="0"/>
+              <a:t>Use Case – Critical Infrastructure</a:t>
+            </a:r>
+            <a:endParaRPr lang="en-US" dirty="0"/>
+          </a:p>
+        </p:txBody>
+      </p:sp>
+      <p:sp>
+        <p:nvSpPr>
+          <p:cNvPr id="3" name="Content Placeholder 2"/>
+          <p:cNvSpPr>
+            <a:spLocks noGrp="1"/>
+          </p:cNvSpPr>
+          <p:nvPr>
+            <p:ph idx="1"/>
+          </p:nvPr>
+        </p:nvSpPr>
+        <p:spPr/>
+        <p:txBody>
+          <a:bodyPr>
+            <a:normAutofit fontScale="92500" lnSpcReduction="10000"/>
+          </a:bodyPr>
+          <a:lstStyle/>
+          <a:p>
+            <a:r>
+              <a:rPr lang="en-US" dirty="0" smtClean="0"/>
+              <a:t>Target: A group of organizations that collaboratively manage critical infrastructure and utilize Industrial Control Systems.</a:t>
+            </a:r>
+          </a:p>
+          <a:p>
+            <a:r>
+              <a:rPr lang="en-US" dirty="0" smtClean="0"/>
+              <a:t>Power, water and other critical infrastructure are threatened by cyber and physical terrorism. </a:t>
+            </a:r>
+          </a:p>
+          <a:p>
+            <a:r>
+              <a:rPr lang="en-US" dirty="0" smtClean="0"/>
+              <a:t>Industrial Control Systems are increasingly computer controlled and connected (directly or indirectly) to the internet and may embed compromised control hardware/software from questionable sources.</a:t>
+            </a:r>
+            <a:endParaRPr lang="en-US" dirty="0"/>
+          </a:p>
+        </p:txBody>
+      </p:sp>
+    </p:spTree>
+    <p:extLst>
+      <p:ext uri="{BB962C8B-B14F-4D97-AF65-F5344CB8AC3E}">
+        <p14:creationId xmlns:p14="http://schemas.microsoft.com/office/powerpoint/2010/main" val="767772092"/>
+      </p:ext>
+    </p:extLst>
+  </p:cSld>
+  <p:clrMapOvr>
+    <a:masterClrMapping/>
+  </p:clrMapOvr>
+</p:sld>
+</file>
+
+<file path=ppt/slides/slide12.xml><?xml version="1.0" encoding="utf-8"?>
+<p:sld xmlns:a="http://schemas.openxmlformats.org/drawingml/2006/main" xmlns:r="http://schemas.openxmlformats.org/officeDocument/2006/relationships" xmlns:p="http://schemas.openxmlformats.org/presentationml/2006/main">
+  <p:cSld>
+    <p:spTree>
+      <p:nvGrpSpPr>
+        <p:cNvPr id="1" name=""/>
+        <p:cNvGrpSpPr/>
+        <p:nvPr/>
+      </p:nvGrpSpPr>
+      <p:grpSpPr>
+        <a:xfrm>
+          <a:off x="0" y="0"/>
+          <a:ext cx="0" cy="0"/>
+          <a:chOff x="0" y="0"/>
+          <a:chExt cx="0" cy="0"/>
+        </a:xfrm>
+      </p:grpSpPr>
+      <p:sp>
+        <p:nvSpPr>
+          <p:cNvPr id="2" name="Title 1"/>
+          <p:cNvSpPr>
+            <a:spLocks noGrp="1"/>
+          </p:cNvSpPr>
+          <p:nvPr>
+            <p:ph type="title"/>
+          </p:nvPr>
+        </p:nvSpPr>
+        <p:spPr/>
+        <p:txBody>
+          <a:bodyPr/>
+          <a:lstStyle/>
+          <a:p>
+            <a:r>
+              <a:rPr lang="en-US" dirty="0"/>
+              <a:t>Use Case – Critical Infrastructure</a:t>
+            </a:r>
+          </a:p>
+        </p:txBody>
+      </p:sp>
+      <p:sp>
+        <p:nvSpPr>
+          <p:cNvPr id="3" name="Content Placeholder 2"/>
+          <p:cNvSpPr>
+            <a:spLocks noGrp="1"/>
+          </p:cNvSpPr>
+          <p:nvPr>
+            <p:ph idx="1"/>
+          </p:nvPr>
+        </p:nvSpPr>
+        <p:spPr/>
+        <p:txBody>
+          <a:bodyPr>
+            <a:normAutofit fontScale="92500" lnSpcReduction="10000"/>
+          </a:bodyPr>
+          <a:lstStyle/>
+          <a:p>
+            <a:r>
+              <a:rPr lang="en-US" dirty="0" smtClean="0"/>
+              <a:t>Scenario 1 – North-East U.S. Power Grid attack by terrorists</a:t>
+            </a:r>
+          </a:p>
+          <a:p>
+            <a:pPr lvl="1"/>
+            <a:r>
+              <a:rPr lang="en-US" dirty="0" smtClean="0"/>
+              <a:t>An undetected and formerly unknown virus is planted in control systems emergency response software.</a:t>
+            </a:r>
+          </a:p>
+          <a:p>
+            <a:pPr lvl="1"/>
+            <a:r>
+              <a:rPr lang="en-US" dirty="0" smtClean="0"/>
+              <a:t>A physical attack on a substation initiates a cascading failure</a:t>
+            </a:r>
+          </a:p>
+          <a:p>
+            <a:pPr lvl="1"/>
+            <a:r>
+              <a:rPr lang="en-US" dirty="0" smtClean="0"/>
+              <a:t>Compromised control systems do not take substations and generating capacity off-line and introduce failure protocols, causing substantial failure of the physical infrastructure</a:t>
+            </a:r>
+          </a:p>
+          <a:p>
+            <a:pPr lvl="1"/>
+            <a:r>
+              <a:rPr lang="en-US" dirty="0" smtClean="0"/>
+              <a:t>Much of the power grid off-line for months</a:t>
+            </a:r>
+            <a:endParaRPr lang="en-US" dirty="0"/>
+          </a:p>
+        </p:txBody>
+      </p:sp>
+    </p:spTree>
+    <p:extLst>
+      <p:ext uri="{BB962C8B-B14F-4D97-AF65-F5344CB8AC3E}">
+        <p14:creationId xmlns:p14="http://schemas.microsoft.com/office/powerpoint/2010/main" val="1133921339"/>
+      </p:ext>
+    </p:extLst>
+  </p:cSld>
+  <p:clrMapOvr>
+    <a:masterClrMapping/>
+  </p:clrMapOvr>
+</p:sld>
+</file>
+
+<file path=ppt/slides/slide13.xml><?xml version="1.0" encoding="utf-8"?>
+<p:sld xmlns:a="http://schemas.openxmlformats.org/drawingml/2006/main" xmlns:r="http://schemas.openxmlformats.org/officeDocument/2006/relationships" xmlns:p="http://schemas.openxmlformats.org/presentationml/2006/main">
+  <p:cSld>
+    <p:spTree>
+      <p:nvGrpSpPr>
+        <p:cNvPr id="1" name=""/>
+        <p:cNvGrpSpPr/>
+        <p:nvPr/>
+      </p:nvGrpSpPr>
+      <p:grpSpPr>
+        <a:xfrm>
+          <a:off x="0" y="0"/>
+          <a:ext cx="0" cy="0"/>
+          <a:chOff x="0" y="0"/>
+          <a:chExt cx="0" cy="0"/>
+        </a:xfrm>
+      </p:grpSpPr>
+      <p:sp>
+        <p:nvSpPr>
+          <p:cNvPr id="2" name="Title 1"/>
+          <p:cNvSpPr>
+            <a:spLocks noGrp="1"/>
+          </p:cNvSpPr>
+          <p:nvPr>
+            <p:ph type="title"/>
+          </p:nvPr>
+        </p:nvSpPr>
+        <p:spPr/>
+        <p:txBody>
+          <a:bodyPr/>
+          <a:lstStyle/>
+          <a:p>
+            <a:r>
+              <a:rPr lang="en-US" dirty="0"/>
+              <a:t>Use Case – Critical Infrastructure</a:t>
+            </a:r>
+          </a:p>
+        </p:txBody>
+      </p:sp>
+      <p:sp>
+        <p:nvSpPr>
+          <p:cNvPr id="3" name="Content Placeholder 2"/>
+          <p:cNvSpPr>
+            <a:spLocks noGrp="1"/>
+          </p:cNvSpPr>
+          <p:nvPr>
+            <p:ph idx="1"/>
+          </p:nvPr>
+        </p:nvSpPr>
+        <p:spPr/>
+        <p:txBody>
+          <a:bodyPr>
+            <a:normAutofit fontScale="92500" lnSpcReduction="10000"/>
+          </a:bodyPr>
+          <a:lstStyle/>
+          <a:p>
+            <a:r>
+              <a:rPr lang="en-US" dirty="0"/>
+              <a:t>Scenario 1 – </a:t>
+            </a:r>
+            <a:r>
+              <a:rPr lang="en-US" dirty="0" smtClean="0"/>
+              <a:t>Mitigations</a:t>
+            </a:r>
+            <a:endParaRPr lang="en-US" dirty="0"/>
+          </a:p>
+          <a:p>
+            <a:pPr lvl="1"/>
+            <a:r>
+              <a:rPr lang="en-US" dirty="0" smtClean="0"/>
+              <a:t>Information from Control Systems, Field Monitors, Physical Security and User reports  are integrated via a threat management console</a:t>
+            </a:r>
+          </a:p>
+          <a:p>
+            <a:pPr lvl="1"/>
+            <a:r>
+              <a:rPr lang="en-US" dirty="0" smtClean="0"/>
+              <a:t>Initial attack is recognized</a:t>
+            </a:r>
+          </a:p>
+          <a:p>
+            <a:pPr lvl="1"/>
+            <a:r>
+              <a:rPr lang="en-US" dirty="0" smtClean="0"/>
+              <a:t>Initial Cascade is recognized</a:t>
+            </a:r>
+          </a:p>
+          <a:p>
+            <a:pPr lvl="1"/>
+            <a:r>
+              <a:rPr lang="en-US" dirty="0" smtClean="0"/>
+              <a:t>Failure of control software generates incorrect action, which is recognized as an </a:t>
+            </a:r>
+            <a:r>
+              <a:rPr lang="en-US" smtClean="0"/>
+              <a:t>additional threat</a:t>
+            </a:r>
+            <a:endParaRPr lang="en-US" dirty="0" smtClean="0"/>
+          </a:p>
+          <a:p>
+            <a:pPr lvl="1"/>
+            <a:r>
+              <a:rPr lang="en-US" dirty="0" smtClean="0"/>
+              <a:t>Integrated threat management creates alert, manual control over infrastructure prevents widespread failure</a:t>
+            </a:r>
+          </a:p>
+          <a:p>
+            <a:pPr lvl="1"/>
+            <a:endParaRPr lang="en-US" dirty="0"/>
+          </a:p>
+        </p:txBody>
+      </p:sp>
+    </p:spTree>
+    <p:extLst>
+      <p:ext uri="{BB962C8B-B14F-4D97-AF65-F5344CB8AC3E}">
+        <p14:creationId xmlns:p14="http://schemas.microsoft.com/office/powerpoint/2010/main" val="61739190"/>
+      </p:ext>
+    </p:extLst>
+  </p:cSld>
+  <p:clrMapOvr>
+    <a:masterClrMapping/>
+  </p:clrMapOvr>
+</p:sld>
+</file>
+
 <file path=ppt/slides/slide2.xml><?xml version="1.0" encoding="utf-8"?>
 <p:sld xmlns:a="http://schemas.openxmlformats.org/drawingml/2006/main" xmlns:r="http://schemas.openxmlformats.org/officeDocument/2006/relationships" xmlns:p="http://schemas.openxmlformats.org/presentationml/2006/main">
   <p:cSld>

</xml_diff>